<commit_message>
Добави Van Gogh quote
</commit_message>
<xml_diff>
--- a/case.solution_2.pptx
+++ b/case.solution_2.pptx
@@ -88,7 +88,7 @@
         <p:txBody>
           <a:bodyPr/>
           <a:p>
-            <a:fld id="{50329F3D-6C0C-4213-A137-27D9F97F2539}" type="slidenum">
+            <a:fld id="{15545C32-0922-4ACC-ABB5-2C94810D01E9}" type="slidenum">
               <a:t>&lt;#&gt;</a:t>
             </a:fld>
           </a:p>
@@ -297,7 +297,7 @@
         <p:txBody>
           <a:bodyPr/>
           <a:p>
-            <a:fld id="{C2C5100E-C820-4B46-8448-22B899F0E477}" type="slidenum">
+            <a:fld id="{3012AE08-DC43-4DF3-A160-C9AF41971D19}" type="slidenum">
               <a:t>&lt;#&gt;</a:t>
             </a:fld>
           </a:p>
@@ -592,7 +592,7 @@
         <p:txBody>
           <a:bodyPr/>
           <a:p>
-            <a:fld id="{20F1EC61-5A28-416D-9B30-B89B01830066}" type="slidenum">
+            <a:fld id="{A22E9377-211D-4BC9-B3D3-69B408AC9729}" type="slidenum">
               <a:t>&lt;#&gt;</a:t>
             </a:fld>
           </a:p>
@@ -973,7 +973,7 @@
         <p:txBody>
           <a:bodyPr/>
           <a:p>
-            <a:fld id="{35CF9D33-5118-4A1D-BD55-EB455E413E51}" type="slidenum">
+            <a:fld id="{D1072118-D192-4F71-8E0C-299C6F523BCA}" type="slidenum">
               <a:t>&lt;#&gt;</a:t>
             </a:fld>
           </a:p>
@@ -1056,7 +1056,7 @@
         <p:txBody>
           <a:bodyPr/>
           <a:p>
-            <a:fld id="{00D76360-D6B4-4773-AD20-D2782917F68C}" type="slidenum">
+            <a:fld id="{238E0E4E-7C83-44FC-8DC5-3C205BEC308F}" type="slidenum">
               <a:t>&lt;#&gt;</a:t>
             </a:fld>
           </a:p>
@@ -1219,7 +1219,7 @@
         <p:txBody>
           <a:bodyPr/>
           <a:p>
-            <a:fld id="{78226E59-B1CD-4747-9B10-FC396FAAA71E}" type="slidenum">
+            <a:fld id="{767A1B4A-F59E-4982-BB3D-EB8FB5234C6B}" type="slidenum">
               <a:t>&lt;#&gt;</a:t>
             </a:fld>
           </a:p>
@@ -1385,7 +1385,7 @@
         <p:txBody>
           <a:bodyPr/>
           <a:p>
-            <a:fld id="{AB668D21-EE9B-491C-9031-401826FF7C58}" type="slidenum">
+            <a:fld id="{6116360C-91D1-4404-BE10-A3AE3BA57A3B}" type="slidenum">
               <a:t>&lt;#&gt;</a:t>
             </a:fld>
           </a:p>
@@ -1594,7 +1594,7 @@
         <p:txBody>
           <a:bodyPr/>
           <a:p>
-            <a:fld id="{925BAD76-7D25-4B90-AC04-57E7E2BF00AD}" type="slidenum">
+            <a:fld id="{2FB1671D-717E-42D6-8B42-9253CB0574D4}" type="slidenum">
               <a:t>&lt;#&gt;</a:t>
             </a:fld>
           </a:p>
@@ -1717,7 +1717,7 @@
         <p:txBody>
           <a:bodyPr/>
           <a:p>
-            <a:fld id="{2A9C903E-003B-4FE3-9DE0-F47840C861C0}" type="slidenum">
+            <a:fld id="{6F4E30A3-01E6-4FC7-8246-705718D0DA56}" type="slidenum">
               <a:t>&lt;#&gt;</a:t>
             </a:fld>
           </a:p>
@@ -1838,7 +1838,7 @@
         <p:txBody>
           <a:bodyPr/>
           <a:p>
-            <a:fld id="{2D2CCD7B-E0AD-4478-A634-0B6ED6CD4086}" type="slidenum">
+            <a:fld id="{5DE6EE48-6974-426F-8796-7C3EAD73D1CF}" type="slidenum">
               <a:t>&lt;#&gt;</a:t>
             </a:fld>
           </a:p>
@@ -2090,7 +2090,7 @@
         <p:txBody>
           <a:bodyPr/>
           <a:p>
-            <a:fld id="{2889CC86-5EBB-426B-9A11-8F6CF6BF350C}" type="slidenum">
+            <a:fld id="{F4288842-9D92-4DCE-81A1-2AA3E749B92E}" type="slidenum">
               <a:t>&lt;#&gt;</a:t>
             </a:fld>
           </a:p>
@@ -2253,7 +2253,7 @@
         <p:txBody>
           <a:bodyPr/>
           <a:p>
-            <a:fld id="{FDFA3FCC-158C-44FD-9A72-A3F0C8931D28}" type="slidenum">
+            <a:fld id="{CD9969B7-04F6-4241-8EE0-D9634CA04EAF}" type="slidenum">
               <a:t>&lt;#&gt;</a:t>
             </a:fld>
           </a:p>
@@ -2505,7 +2505,7 @@
         <p:txBody>
           <a:bodyPr/>
           <a:p>
-            <a:fld id="{26FCC5F9-6669-4785-8E17-777006B25271}" type="slidenum">
+            <a:fld id="{2949C46C-594F-4586-8957-504920523D0A}" type="slidenum">
               <a:t>&lt;#&gt;</a:t>
             </a:fld>
           </a:p>
@@ -2757,7 +2757,7 @@
         <p:txBody>
           <a:bodyPr/>
           <a:p>
-            <a:fld id="{0CE19811-66D2-43C9-B659-1DFA225AB621}" type="slidenum">
+            <a:fld id="{D396DC58-0023-4998-BAD2-3B474B535D6B}" type="slidenum">
               <a:t>&lt;#&gt;</a:t>
             </a:fld>
           </a:p>
@@ -2966,7 +2966,7 @@
         <p:txBody>
           <a:bodyPr/>
           <a:p>
-            <a:fld id="{5406EA20-27F8-4EB8-91A3-ABD6A5446438}" type="slidenum">
+            <a:fld id="{2FF390FD-764C-41DE-94B0-D2D8317C8705}" type="slidenum">
               <a:t>&lt;#&gt;</a:t>
             </a:fld>
           </a:p>
@@ -3261,7 +3261,7 @@
         <p:txBody>
           <a:bodyPr/>
           <a:p>
-            <a:fld id="{4C8B3D44-4B76-4F3E-AE3D-3F8BADAFA9BD}" type="slidenum">
+            <a:fld id="{019A1683-9418-4C25-A11D-964733D098B9}" type="slidenum">
               <a:t>&lt;#&gt;</a:t>
             </a:fld>
           </a:p>
@@ -3642,7 +3642,7 @@
         <p:txBody>
           <a:bodyPr/>
           <a:p>
-            <a:fld id="{4FECB0FB-8BF3-480F-9154-560A2BF6D454}" type="slidenum">
+            <a:fld id="{C9F46E2E-FBDD-42CE-8349-7FF8E8564DA6}" type="slidenum">
               <a:t>&lt;#&gt;</a:t>
             </a:fld>
           </a:p>
@@ -3725,7 +3725,7 @@
         <p:txBody>
           <a:bodyPr/>
           <a:p>
-            <a:fld id="{8BB43545-426D-4332-80A3-7116B41F8DDF}" type="slidenum">
+            <a:fld id="{A5D7E4C3-9C97-473B-9E93-A2C15566F206}" type="slidenum">
               <a:t>&lt;#&gt;</a:t>
             </a:fld>
           </a:p>
@@ -3888,7 +3888,7 @@
         <p:txBody>
           <a:bodyPr/>
           <a:p>
-            <a:fld id="{3194C8F5-E719-45F8-8A6D-BDFEEC28E47A}" type="slidenum">
+            <a:fld id="{146AA38C-8047-4400-8384-0FCF98344A32}" type="slidenum">
               <a:t>&lt;#&gt;</a:t>
             </a:fld>
           </a:p>
@@ -4054,7 +4054,7 @@
         <p:txBody>
           <a:bodyPr/>
           <a:p>
-            <a:fld id="{CC3CA75F-8DCA-4818-A22C-255BDA5C3182}" type="slidenum">
+            <a:fld id="{64EF80BF-47D1-4BDA-9849-DC8C31411843}" type="slidenum">
               <a:t>&lt;#&gt;</a:t>
             </a:fld>
           </a:p>
@@ -4263,7 +4263,7 @@
         <p:txBody>
           <a:bodyPr/>
           <a:p>
-            <a:fld id="{27121B05-557B-4761-B441-3B57FDC1CD13}" type="slidenum">
+            <a:fld id="{6E1BC807-96AE-40EB-B481-59B491A893C7}" type="slidenum">
               <a:t>&lt;#&gt;</a:t>
             </a:fld>
           </a:p>
@@ -4386,7 +4386,7 @@
         <p:txBody>
           <a:bodyPr/>
           <a:p>
-            <a:fld id="{82C1DFB0-6F51-4190-B748-7243AFFE4F43}" type="slidenum">
+            <a:fld id="{6F088A21-8DA2-4CF1-8223-EB5DB57C780D}" type="slidenum">
               <a:t>&lt;#&gt;</a:t>
             </a:fld>
           </a:p>
@@ -4552,7 +4552,7 @@
         <p:txBody>
           <a:bodyPr/>
           <a:p>
-            <a:fld id="{4888B927-D0E5-498C-A050-84DFF74A7BC5}" type="slidenum">
+            <a:fld id="{F2370128-B96C-428F-A4FA-F6841420D20B}" type="slidenum">
               <a:t>&lt;#&gt;</a:t>
             </a:fld>
           </a:p>
@@ -4673,7 +4673,7 @@
         <p:txBody>
           <a:bodyPr/>
           <a:p>
-            <a:fld id="{8DCC2766-5EF4-4151-967D-C3FB7045DBD7}" type="slidenum">
+            <a:fld id="{573E28CC-145F-4419-9A29-E99445F77872}" type="slidenum">
               <a:t>&lt;#&gt;</a:t>
             </a:fld>
           </a:p>
@@ -4925,7 +4925,7 @@
         <p:txBody>
           <a:bodyPr/>
           <a:p>
-            <a:fld id="{A87E719E-DEFD-4EFC-8F86-EC4277E7C53E}" type="slidenum">
+            <a:fld id="{C855433A-32E5-4FBD-B14F-9B9DE8028218}" type="slidenum">
               <a:t>&lt;#&gt;</a:t>
             </a:fld>
           </a:p>
@@ -5177,7 +5177,7 @@
         <p:txBody>
           <a:bodyPr/>
           <a:p>
-            <a:fld id="{B33F90F6-D738-4E8D-AAC9-BF4B61E12F05}" type="slidenum">
+            <a:fld id="{FBC7C957-99A0-4F2D-9894-DEB29D5CCB9F}" type="slidenum">
               <a:t>&lt;#&gt;</a:t>
             </a:fld>
           </a:p>
@@ -5429,7 +5429,7 @@
         <p:txBody>
           <a:bodyPr/>
           <a:p>
-            <a:fld id="{8865BE4F-20ED-4BB9-8395-068F31E7178D}" type="slidenum">
+            <a:fld id="{29DDBAF5-ACD5-4865-B421-D1FF6F9A4DDB}" type="slidenum">
               <a:t>&lt;#&gt;</a:t>
             </a:fld>
           </a:p>
@@ -5638,7 +5638,7 @@
         <p:txBody>
           <a:bodyPr/>
           <a:p>
-            <a:fld id="{111FFC35-1CE2-4941-B6C6-EF5900BF6859}" type="slidenum">
+            <a:fld id="{19182A36-1766-4CD2-8154-5C6577FD8860}" type="slidenum">
               <a:t>&lt;#&gt;</a:t>
             </a:fld>
           </a:p>
@@ -5933,7 +5933,7 @@
         <p:txBody>
           <a:bodyPr/>
           <a:p>
-            <a:fld id="{2E4140E2-FB2F-49E2-B2D0-0E5660F673FD}" type="slidenum">
+            <a:fld id="{44F9A8B9-4F68-4C82-BE3C-187648022D82}" type="slidenum">
               <a:t>&lt;#&gt;</a:t>
             </a:fld>
           </a:p>
@@ -6314,7 +6314,7 @@
         <p:txBody>
           <a:bodyPr/>
           <a:p>
-            <a:fld id="{C41F892C-1570-40CC-BA24-6E134BB3D9D4}" type="slidenum">
+            <a:fld id="{243EB792-818C-4B44-AFCA-8AA221B14DE1}" type="slidenum">
               <a:t>&lt;#&gt;</a:t>
             </a:fld>
           </a:p>
@@ -6523,7 +6523,7 @@
         <p:txBody>
           <a:bodyPr/>
           <a:p>
-            <a:fld id="{21E57564-3BA9-43F5-96B8-8FB5A7F47381}" type="slidenum">
+            <a:fld id="{1E3773E5-87A5-40A7-8F23-E0DA42F3083C}" type="slidenum">
               <a:t>&lt;#&gt;</a:t>
             </a:fld>
           </a:p>
@@ -6646,7 +6646,7 @@
         <p:txBody>
           <a:bodyPr/>
           <a:p>
-            <a:fld id="{B36319B0-95E1-4F94-847F-E0B5762CD4C5}" type="slidenum">
+            <a:fld id="{43042BAA-0E7B-4DCB-A57F-51A912EA6FFF}" type="slidenum">
               <a:t>&lt;#&gt;</a:t>
             </a:fld>
           </a:p>
@@ -6767,7 +6767,7 @@
         <p:txBody>
           <a:bodyPr/>
           <a:p>
-            <a:fld id="{F32FAADE-33FA-4445-93C4-D47F81F7ABD7}" type="slidenum">
+            <a:fld id="{A1236FBE-EFBC-4189-8CEB-E23B5AD41270}" type="slidenum">
               <a:t>&lt;#&gt;</a:t>
             </a:fld>
           </a:p>
@@ -7019,7 +7019,7 @@
         <p:txBody>
           <a:bodyPr/>
           <a:p>
-            <a:fld id="{595DBB3D-3695-4C72-A037-4377F62D6890}" type="slidenum">
+            <a:fld id="{2C2E32C6-B781-4FC9-8758-D04CB910261C}" type="slidenum">
               <a:t>&lt;#&gt;</a:t>
             </a:fld>
           </a:p>
@@ -7271,7 +7271,7 @@
         <p:txBody>
           <a:bodyPr/>
           <a:p>
-            <a:fld id="{AD1EF56B-5B30-41E7-ABDB-A628F48A3F84}" type="slidenum">
+            <a:fld id="{FFE3864F-E8FA-452C-A064-4190E35C40FB}" type="slidenum">
               <a:t>&lt;#&gt;</a:t>
             </a:fld>
           </a:p>
@@ -7523,7 +7523,7 @@
         <p:txBody>
           <a:bodyPr/>
           <a:p>
-            <a:fld id="{163AB4F7-DF5C-4558-8D66-CBCAC44D5D80}" type="slidenum">
+            <a:fld id="{09DA051B-6EC0-47C1-95DA-E0B92D52591C}" type="slidenum">
               <a:t>&lt;#&gt;</a:t>
             </a:fld>
           </a:p>
@@ -7591,8 +7591,8 @@
         </p:nvSpPr>
         <p:spPr>
           <a:xfrm>
-            <a:off x="628560" y="365040"/>
-            <a:ext cx="7886160" cy="1324800"/>
+            <a:off x="457200" y="273600"/>
+            <a:ext cx="8228880" cy="1144440"/>
           </a:xfrm>
           <a:prstGeom prst="rect">
             <a:avLst/>
@@ -7635,13 +7635,238 @@
             <a:spLocks noGrp="1"/>
           </p:cNvSpPr>
           <p:nvPr>
+            <p:ph type="body"/>
+          </p:nvPr>
+        </p:nvSpPr>
+        <p:spPr>
+          <a:xfrm>
+            <a:off x="457200" y="1604520"/>
+            <a:ext cx="8228880" cy="3976920"/>
+          </a:xfrm>
+          <a:prstGeom prst="rect">
+            <a:avLst/>
+          </a:prstGeom>
+          <a:noFill/>
+          <a:ln w="0">
+            <a:noFill/>
+          </a:ln>
+        </p:spPr>
+        <p:txBody>
+          <a:bodyPr lIns="0" rIns="0" tIns="0" bIns="0" anchor="t">
+            <a:normAutofit/>
+          </a:bodyPr>
+          <a:p>
+            <a:pPr marL="432000" indent="-324000">
+              <a:spcBef>
+                <a:spcPts val="1417"/>
+              </a:spcBef>
+              <a:buClr>
+                <a:srgbClr val="000000"/>
+              </a:buClr>
+              <a:buSzPct val="45000"/>
+              <a:buFont typeface="Wingdings" charset="2"/>
+              <a:buChar char=""/>
+            </a:pPr>
+            <a:r>
+              <a:rPr b="0" lang="en-US" sz="1800" spc="-1" strike="noStrike">
+                <a:solidFill>
+                  <a:srgbClr val="000000"/>
+                </a:solidFill>
+                <a:latin typeface="Arial"/>
+              </a:rPr>
+              <a:t>Format des Gliederungstextes durch Klicken bearbeiten</a:t>
+            </a:r>
+            <a:endParaRPr b="0" lang="en-US" sz="1800" spc="-1" strike="noStrike">
+              <a:solidFill>
+                <a:srgbClr val="000000"/>
+              </a:solidFill>
+              <a:latin typeface="Arial"/>
+            </a:endParaRPr>
+          </a:p>
+          <a:p>
+            <a:pPr lvl="1" marL="864000" indent="-324000">
+              <a:spcBef>
+                <a:spcPts val="1134"/>
+              </a:spcBef>
+              <a:buClr>
+                <a:srgbClr val="000000"/>
+              </a:buClr>
+              <a:buSzPct val="75000"/>
+              <a:buFont typeface="Symbol" charset="2"/>
+              <a:buChar char=""/>
+            </a:pPr>
+            <a:r>
+              <a:rPr b="0" lang="en-US" sz="1800" spc="-1" strike="noStrike">
+                <a:solidFill>
+                  <a:srgbClr val="000000"/>
+                </a:solidFill>
+                <a:latin typeface="Arial"/>
+              </a:rPr>
+              <a:t>Zweite Gliederungsebene</a:t>
+            </a:r>
+            <a:endParaRPr b="0" lang="en-US" sz="1800" spc="-1" strike="noStrike">
+              <a:solidFill>
+                <a:srgbClr val="000000"/>
+              </a:solidFill>
+              <a:latin typeface="Arial"/>
+            </a:endParaRPr>
+          </a:p>
+          <a:p>
+            <a:pPr lvl="2" marL="1296000" indent="-288000">
+              <a:spcBef>
+                <a:spcPts val="850"/>
+              </a:spcBef>
+              <a:buClr>
+                <a:srgbClr val="000000"/>
+              </a:buClr>
+              <a:buSzPct val="45000"/>
+              <a:buFont typeface="Wingdings" charset="2"/>
+              <a:buChar char=""/>
+            </a:pPr>
+            <a:r>
+              <a:rPr b="0" lang="en-US" sz="1800" spc="-1" strike="noStrike">
+                <a:solidFill>
+                  <a:srgbClr val="000000"/>
+                </a:solidFill>
+                <a:latin typeface="Arial"/>
+              </a:rPr>
+              <a:t>Dritte Gliederungsebene</a:t>
+            </a:r>
+            <a:endParaRPr b="0" lang="en-US" sz="1800" spc="-1" strike="noStrike">
+              <a:solidFill>
+                <a:srgbClr val="000000"/>
+              </a:solidFill>
+              <a:latin typeface="Arial"/>
+            </a:endParaRPr>
+          </a:p>
+          <a:p>
+            <a:pPr lvl="3" marL="1728000" indent="-216000">
+              <a:spcBef>
+                <a:spcPts val="567"/>
+              </a:spcBef>
+              <a:buClr>
+                <a:srgbClr val="000000"/>
+              </a:buClr>
+              <a:buSzPct val="75000"/>
+              <a:buFont typeface="Symbol" charset="2"/>
+              <a:buChar char=""/>
+            </a:pPr>
+            <a:r>
+              <a:rPr b="0" lang="en-US" sz="1800" spc="-1" strike="noStrike">
+                <a:solidFill>
+                  <a:srgbClr val="000000"/>
+                </a:solidFill>
+                <a:latin typeface="Arial"/>
+              </a:rPr>
+              <a:t>Vierte Gliederungsebene</a:t>
+            </a:r>
+            <a:endParaRPr b="0" lang="en-US" sz="1800" spc="-1" strike="noStrike">
+              <a:solidFill>
+                <a:srgbClr val="000000"/>
+              </a:solidFill>
+              <a:latin typeface="Arial"/>
+            </a:endParaRPr>
+          </a:p>
+          <a:p>
+            <a:pPr lvl="4" marL="2160000" indent="-216000">
+              <a:spcBef>
+                <a:spcPts val="283"/>
+              </a:spcBef>
+              <a:buClr>
+                <a:srgbClr val="000000"/>
+              </a:buClr>
+              <a:buSzPct val="45000"/>
+              <a:buFont typeface="Wingdings" charset="2"/>
+              <a:buChar char=""/>
+            </a:pPr>
+            <a:r>
+              <a:rPr b="0" lang="en-US" sz="1800" spc="-1" strike="noStrike">
+                <a:solidFill>
+                  <a:srgbClr val="000000"/>
+                </a:solidFill>
+                <a:latin typeface="Arial"/>
+              </a:rPr>
+              <a:t>Fünfte Gliederungsebene</a:t>
+            </a:r>
+            <a:endParaRPr b="0" lang="en-US" sz="1800" spc="-1" strike="noStrike">
+              <a:solidFill>
+                <a:srgbClr val="000000"/>
+              </a:solidFill>
+              <a:latin typeface="Arial"/>
+            </a:endParaRPr>
+          </a:p>
+          <a:p>
+            <a:pPr lvl="5" marL="2592000" indent="-216000">
+              <a:spcBef>
+                <a:spcPts val="283"/>
+              </a:spcBef>
+              <a:buClr>
+                <a:srgbClr val="000000"/>
+              </a:buClr>
+              <a:buSzPct val="45000"/>
+              <a:buFont typeface="Wingdings" charset="2"/>
+              <a:buChar char=""/>
+            </a:pPr>
+            <a:r>
+              <a:rPr b="0" lang="en-US" sz="1800" spc="-1" strike="noStrike">
+                <a:solidFill>
+                  <a:srgbClr val="000000"/>
+                </a:solidFill>
+                <a:latin typeface="Arial"/>
+              </a:rPr>
+              <a:t>Sechste Gliederungsebene</a:t>
+            </a:r>
+            <a:endParaRPr b="0" lang="en-US" sz="1800" spc="-1" strike="noStrike">
+              <a:solidFill>
+                <a:srgbClr val="000000"/>
+              </a:solidFill>
+              <a:latin typeface="Arial"/>
+            </a:endParaRPr>
+          </a:p>
+          <a:p>
+            <a:pPr lvl="6" marL="3024000" indent="-216000">
+              <a:spcBef>
+                <a:spcPts val="283"/>
+              </a:spcBef>
+              <a:buClr>
+                <a:srgbClr val="000000"/>
+              </a:buClr>
+              <a:buSzPct val="45000"/>
+              <a:buFont typeface="Wingdings" charset="2"/>
+              <a:buChar char=""/>
+            </a:pPr>
+            <a:r>
+              <a:rPr b="0" lang="en-US" sz="1800" spc="-1" strike="noStrike">
+                <a:solidFill>
+                  <a:srgbClr val="000000"/>
+                </a:solidFill>
+                <a:latin typeface="Arial"/>
+              </a:rPr>
+              <a:t>Siebte Gliederungsebene</a:t>
+            </a:r>
+            <a:endParaRPr b="0" lang="en-US" sz="1800" spc="-1" strike="noStrike">
+              <a:solidFill>
+                <a:srgbClr val="000000"/>
+              </a:solidFill>
+              <a:latin typeface="Arial"/>
+            </a:endParaRPr>
+          </a:p>
+        </p:txBody>
+      </p:sp>
+      <p:sp>
+        <p:nvSpPr>
+          <p:cNvPr id="2" name="PlaceHolder 3"/>
+          <p:cNvSpPr>
+            <a:spLocks noGrp="1"/>
+          </p:cNvSpPr>
+          <p:nvPr>
             <p:ph type="ftr" idx="1"/>
           </p:nvPr>
         </p:nvSpPr>
         <p:spPr>
           <a:xfrm>
             <a:off x="3029040" y="6356520"/>
-            <a:ext cx="3085560" cy="364320"/>
+            <a:ext cx="3085200" cy="363960"/>
           </a:xfrm>
           <a:prstGeom prst="rect">
             <a:avLst/>
@@ -7702,7 +7927,7 @@
       </p:sp>
       <p:sp>
         <p:nvSpPr>
-          <p:cNvPr id="2" name="PlaceHolder 3"/>
+          <p:cNvPr id="3" name="PlaceHolder 4"/>
           <p:cNvSpPr>
             <a:spLocks noGrp="1"/>
           </p:cNvSpPr>
@@ -7713,7 +7938,7 @@
         <p:spPr>
           <a:xfrm>
             <a:off x="6458040" y="6356520"/>
-            <a:ext cx="2056680" cy="364320"/>
+            <a:ext cx="2056320" cy="363960"/>
           </a:xfrm>
           <a:prstGeom prst="rect">
             <a:avLst/>
@@ -7754,7 +7979,7 @@
                 <a:tab algn="l" pos="0"/>
               </a:tabLst>
             </a:pPr>
-            <a:fld id="{F45C6296-7FB3-4D5C-9A67-C4BA2112A0EA}" type="slidenum">
+            <a:fld id="{2162771E-AEBF-445C-9BE3-C00AD26B34AE}" type="slidenum">
               <a:rPr b="0" lang="en-GB" sz="1200" spc="-1" strike="noStrike">
                 <a:solidFill>
                   <a:srgbClr val="8b8b8b"/>
@@ -7774,7 +7999,7 @@
       </p:sp>
       <p:sp>
         <p:nvSpPr>
-          <p:cNvPr id="3" name="PlaceHolder 4"/>
+          <p:cNvPr id="4" name="PlaceHolder 5"/>
           <p:cNvSpPr>
             <a:spLocks noGrp="1"/>
           </p:cNvSpPr>
@@ -7785,7 +8010,7 @@
         <p:spPr>
           <a:xfrm>
             <a:off x="628560" y="6356520"/>
-            <a:ext cx="2056680" cy="364320"/>
+            <a:ext cx="2056320" cy="363960"/>
           </a:xfrm>
           <a:prstGeom prst="rect">
             <a:avLst/>
@@ -7828,231 +8053,6 @@
                 <a:srgbClr val="000000"/>
               </a:solidFill>
               <a:latin typeface="Times New Roman"/>
-            </a:endParaRPr>
-          </a:p>
-        </p:txBody>
-      </p:sp>
-      <p:sp>
-        <p:nvSpPr>
-          <p:cNvPr id="4" name="PlaceHolder 5"/>
-          <p:cNvSpPr>
-            <a:spLocks noGrp="1"/>
-          </p:cNvSpPr>
-          <p:nvPr>
-            <p:ph type="body"/>
-          </p:nvPr>
-        </p:nvSpPr>
-        <p:spPr>
-          <a:xfrm>
-            <a:off x="457200" y="1604520"/>
-            <a:ext cx="8229240" cy="3977280"/>
-          </a:xfrm>
-          <a:prstGeom prst="rect">
-            <a:avLst/>
-          </a:prstGeom>
-          <a:noFill/>
-          <a:ln w="0">
-            <a:noFill/>
-          </a:ln>
-        </p:spPr>
-        <p:txBody>
-          <a:bodyPr lIns="0" rIns="0" tIns="0" bIns="0" anchor="t">
-            <a:normAutofit/>
-          </a:bodyPr>
-          <a:p>
-            <a:pPr marL="432000" indent="-324000">
-              <a:spcBef>
-                <a:spcPts val="1417"/>
-              </a:spcBef>
-              <a:buClr>
-                <a:srgbClr val="000000"/>
-              </a:buClr>
-              <a:buSzPct val="45000"/>
-              <a:buFont typeface="Wingdings" charset="2"/>
-              <a:buChar char=""/>
-            </a:pPr>
-            <a:r>
-              <a:rPr b="0" lang="en-US" sz="3200" spc="-1" strike="noStrike">
-                <a:solidFill>
-                  <a:srgbClr val="000000"/>
-                </a:solidFill>
-                <a:latin typeface="Arial"/>
-              </a:rPr>
-              <a:t>Format des Gliederungstextes durch Klicken bearbeiten</a:t>
-            </a:r>
-            <a:endParaRPr b="0" lang="en-US" sz="3200" spc="-1" strike="noStrike">
-              <a:solidFill>
-                <a:srgbClr val="000000"/>
-              </a:solidFill>
-              <a:latin typeface="Arial"/>
-            </a:endParaRPr>
-          </a:p>
-          <a:p>
-            <a:pPr lvl="1" marL="864000" indent="-324000">
-              <a:spcBef>
-                <a:spcPts val="1134"/>
-              </a:spcBef>
-              <a:buClr>
-                <a:srgbClr val="000000"/>
-              </a:buClr>
-              <a:buSzPct val="75000"/>
-              <a:buFont typeface="Symbol" charset="2"/>
-              <a:buChar char=""/>
-            </a:pPr>
-            <a:r>
-              <a:rPr b="0" lang="en-US" sz="2800" spc="-1" strike="noStrike">
-                <a:solidFill>
-                  <a:srgbClr val="000000"/>
-                </a:solidFill>
-                <a:latin typeface="Arial"/>
-              </a:rPr>
-              <a:t>Zweite Gliederungsebene</a:t>
-            </a:r>
-            <a:endParaRPr b="0" lang="en-US" sz="2800" spc="-1" strike="noStrike">
-              <a:solidFill>
-                <a:srgbClr val="000000"/>
-              </a:solidFill>
-              <a:latin typeface="Arial"/>
-            </a:endParaRPr>
-          </a:p>
-          <a:p>
-            <a:pPr lvl="2" marL="1296000" indent="-288000">
-              <a:spcBef>
-                <a:spcPts val="850"/>
-              </a:spcBef>
-              <a:buClr>
-                <a:srgbClr val="000000"/>
-              </a:buClr>
-              <a:buSzPct val="45000"/>
-              <a:buFont typeface="Wingdings" charset="2"/>
-              <a:buChar char=""/>
-            </a:pPr>
-            <a:r>
-              <a:rPr b="0" lang="en-US" sz="2400" spc="-1" strike="noStrike">
-                <a:solidFill>
-                  <a:srgbClr val="000000"/>
-                </a:solidFill>
-                <a:latin typeface="Arial"/>
-              </a:rPr>
-              <a:t>Dritte Gliederungsebene</a:t>
-            </a:r>
-            <a:endParaRPr b="0" lang="en-US" sz="2400" spc="-1" strike="noStrike">
-              <a:solidFill>
-                <a:srgbClr val="000000"/>
-              </a:solidFill>
-              <a:latin typeface="Arial"/>
-            </a:endParaRPr>
-          </a:p>
-          <a:p>
-            <a:pPr lvl="3" marL="1728000" indent="-216000">
-              <a:spcBef>
-                <a:spcPts val="567"/>
-              </a:spcBef>
-              <a:buClr>
-                <a:srgbClr val="000000"/>
-              </a:buClr>
-              <a:buSzPct val="75000"/>
-              <a:buFont typeface="Symbol" charset="2"/>
-              <a:buChar char=""/>
-            </a:pPr>
-            <a:r>
-              <a:rPr b="0" lang="en-US" sz="2000" spc="-1" strike="noStrike">
-                <a:solidFill>
-                  <a:srgbClr val="000000"/>
-                </a:solidFill>
-                <a:latin typeface="Arial"/>
-              </a:rPr>
-              <a:t>Vierte Gliederungsebene</a:t>
-            </a:r>
-            <a:endParaRPr b="0" lang="en-US" sz="2000" spc="-1" strike="noStrike">
-              <a:solidFill>
-                <a:srgbClr val="000000"/>
-              </a:solidFill>
-              <a:latin typeface="Arial"/>
-            </a:endParaRPr>
-          </a:p>
-          <a:p>
-            <a:pPr lvl="4" marL="2160000" indent="-216000">
-              <a:spcBef>
-                <a:spcPts val="283"/>
-              </a:spcBef>
-              <a:buClr>
-                <a:srgbClr val="000000"/>
-              </a:buClr>
-              <a:buSzPct val="45000"/>
-              <a:buFont typeface="Wingdings" charset="2"/>
-              <a:buChar char=""/>
-            </a:pPr>
-            <a:r>
-              <a:rPr b="0" lang="en-US" sz="2000" spc="-1" strike="noStrike">
-                <a:solidFill>
-                  <a:srgbClr val="000000"/>
-                </a:solidFill>
-                <a:latin typeface="Arial"/>
-              </a:rPr>
-              <a:t>Fünfte Gliederungsebene</a:t>
-            </a:r>
-            <a:endParaRPr b="0" lang="en-US" sz="2000" spc="-1" strike="noStrike">
-              <a:solidFill>
-                <a:srgbClr val="000000"/>
-              </a:solidFill>
-              <a:latin typeface="Arial"/>
-            </a:endParaRPr>
-          </a:p>
-          <a:p>
-            <a:pPr lvl="5" marL="2592000" indent="-216000">
-              <a:spcBef>
-                <a:spcPts val="283"/>
-              </a:spcBef>
-              <a:buClr>
-                <a:srgbClr val="000000"/>
-              </a:buClr>
-              <a:buSzPct val="45000"/>
-              <a:buFont typeface="Wingdings" charset="2"/>
-              <a:buChar char=""/>
-            </a:pPr>
-            <a:r>
-              <a:rPr b="0" lang="en-US" sz="2000" spc="-1" strike="noStrike">
-                <a:solidFill>
-                  <a:srgbClr val="000000"/>
-                </a:solidFill>
-                <a:latin typeface="Arial"/>
-              </a:rPr>
-              <a:t>Sechste Gliederungsebene</a:t>
-            </a:r>
-            <a:endParaRPr b="0" lang="en-US" sz="2000" spc="-1" strike="noStrike">
-              <a:solidFill>
-                <a:srgbClr val="000000"/>
-              </a:solidFill>
-              <a:latin typeface="Arial"/>
-            </a:endParaRPr>
-          </a:p>
-          <a:p>
-            <a:pPr lvl="6" marL="3024000" indent="-216000">
-              <a:spcBef>
-                <a:spcPts val="283"/>
-              </a:spcBef>
-              <a:buClr>
-                <a:srgbClr val="000000"/>
-              </a:buClr>
-              <a:buSzPct val="45000"/>
-              <a:buFont typeface="Wingdings" charset="2"/>
-              <a:buChar char=""/>
-            </a:pPr>
-            <a:r>
-              <a:rPr b="0" lang="en-US" sz="2000" spc="-1" strike="noStrike">
-                <a:solidFill>
-                  <a:srgbClr val="000000"/>
-                </a:solidFill>
-                <a:latin typeface="Arial"/>
-              </a:rPr>
-              <a:t>Siebte Gliederungsebene</a:t>
-            </a:r>
-            <a:endParaRPr b="0" lang="en-US" sz="2000" spc="-1" strike="noStrike">
-              <a:solidFill>
-                <a:srgbClr val="000000"/>
-              </a:solidFill>
-              <a:latin typeface="Arial"/>
             </a:endParaRPr>
           </a:p>
         </p:txBody>
@@ -8114,7 +8114,7 @@
         <p:spPr>
           <a:xfrm>
             <a:off x="3029040" y="6356520"/>
-            <a:ext cx="3085560" cy="364320"/>
+            <a:ext cx="3085200" cy="363960"/>
           </a:xfrm>
           <a:prstGeom prst="rect">
             <a:avLst/>
@@ -8186,7 +8186,7 @@
         <p:spPr>
           <a:xfrm>
             <a:off x="6458040" y="6356520"/>
-            <a:ext cx="2056680" cy="364320"/>
+            <a:ext cx="2056320" cy="363960"/>
           </a:xfrm>
           <a:prstGeom prst="rect">
             <a:avLst/>
@@ -8227,7 +8227,7 @@
                 <a:tab algn="l" pos="0"/>
               </a:tabLst>
             </a:pPr>
-            <a:fld id="{86CFC890-BEEC-4541-AEA6-3A5B874E8826}" type="slidenum">
+            <a:fld id="{96F3C0A0-21A2-4B00-9F84-9B2E089BD8B9}" type="slidenum">
               <a:rPr b="0" lang="en-GB" sz="1200" spc="-1" strike="noStrike">
                 <a:solidFill>
                   <a:srgbClr val="8b8b8b"/>
@@ -8258,7 +8258,7 @@
         <p:spPr>
           <a:xfrm>
             <a:off x="628560" y="6356520"/>
-            <a:ext cx="2056680" cy="364320"/>
+            <a:ext cx="2056320" cy="363960"/>
           </a:xfrm>
           <a:prstGeom prst="rect">
             <a:avLst/>
@@ -8635,8 +8635,8 @@
         </p:nvSpPr>
         <p:spPr>
           <a:xfrm>
-            <a:off x="628560" y="365040"/>
-            <a:ext cx="7886160" cy="1324800"/>
+            <a:off x="457200" y="273600"/>
+            <a:ext cx="8228880" cy="1144440"/>
           </a:xfrm>
           <a:prstGeom prst="rect">
             <a:avLst/>
@@ -8685,7 +8685,7 @@
         <p:spPr>
           <a:xfrm>
             <a:off x="3029040" y="6356520"/>
-            <a:ext cx="3085560" cy="364320"/>
+            <a:ext cx="3085200" cy="363960"/>
           </a:xfrm>
           <a:prstGeom prst="rect">
             <a:avLst/>
@@ -8757,7 +8757,7 @@
         <p:spPr>
           <a:xfrm>
             <a:off x="6458040" y="6356520"/>
-            <a:ext cx="2056680" cy="364320"/>
+            <a:ext cx="2056320" cy="363960"/>
           </a:xfrm>
           <a:prstGeom prst="rect">
             <a:avLst/>
@@ -8798,7 +8798,7 @@
                 <a:tab algn="l" pos="0"/>
               </a:tabLst>
             </a:pPr>
-            <a:fld id="{E898D9FB-A8FC-4A2D-BA84-74ACFD20FEEB}" type="slidenum">
+            <a:fld id="{05E9812B-196B-458B-99BD-4CC4C4D54915}" type="slidenum">
               <a:rPr b="0" lang="en-GB" sz="1200" spc="-1" strike="noStrike">
                 <a:solidFill>
                   <a:srgbClr val="8b8b8b"/>
@@ -8829,7 +8829,7 @@
         <p:spPr>
           <a:xfrm>
             <a:off x="628560" y="6356520"/>
-            <a:ext cx="2056680" cy="364320"/>
+            <a:ext cx="2056320" cy="363960"/>
           </a:xfrm>
           <a:prstGeom prst="rect">
             <a:avLst/>
@@ -9150,8 +9150,8 @@
         </p:nvSpPr>
         <p:spPr>
           <a:xfrm>
-            <a:off x="646920" y="695160"/>
-            <a:ext cx="7771680" cy="2423880"/>
+            <a:off x="297000" y="2415600"/>
+            <a:ext cx="8467920" cy="1293480"/>
           </a:xfrm>
           <a:prstGeom prst="rect">
             <a:avLst/>
@@ -9163,7 +9163,7 @@
         </p:spPr>
         <p:txBody>
           <a:bodyPr lIns="0" rIns="0" tIns="0" bIns="0" anchor="b">
-            <a:normAutofit fontScale="85000"/>
+            <a:normAutofit fontScale="78000"/>
           </a:bodyPr>
           <a:p>
             <a:pPr indent="0" algn="ctr">
@@ -9196,17 +9196,13 @@
       <p:sp>
         <p:nvSpPr>
           <p:cNvPr id="124" name="PlaceHolder 2"/>
-          <p:cNvSpPr>
-            <a:spLocks noGrp="1"/>
-          </p:cNvSpPr>
-          <p:nvPr>
-            <p:ph type="subTitle"/>
-          </p:nvPr>
-        </p:nvSpPr>
-        <p:spPr>
-          <a:xfrm>
-            <a:off x="1113840" y="3742200"/>
-            <a:ext cx="6857280" cy="535320"/>
+          <p:cNvSpPr txBox="1"/>
+          <p:nvPr/>
+        </p:nvSpPr>
+        <p:spPr>
+          <a:xfrm>
+            <a:off x="1140120" y="4156920"/>
+            <a:ext cx="6856920" cy="1572120"/>
           </a:xfrm>
           <a:prstGeom prst="rect">
             <a:avLst/>
@@ -9338,6 +9334,29 @@
           </a:p>
         </p:txBody>
       </p:sp>
+      <p:pic>
+        <p:nvPicPr>
+          <p:cNvPr id="125" name="" descr=""/>
+          <p:cNvPicPr/>
+          <p:nvPr/>
+        </p:nvPicPr>
+        <p:blipFill>
+          <a:blip r:embed="rId1"/>
+          <a:stretch/>
+        </p:blipFill>
+        <p:spPr>
+          <a:xfrm>
+            <a:off x="158400" y="219600"/>
+            <a:ext cx="6166800" cy="1309320"/>
+          </a:xfrm>
+          <a:prstGeom prst="rect">
+            <a:avLst/>
+          </a:prstGeom>
+          <a:ln w="0">
+            <a:noFill/>
+          </a:ln>
+        </p:spPr>
+      </p:pic>
     </p:spTree>
   </p:cSld>
   <mc:AlternateContent>
@@ -9370,7 +9389,7 @@
       </p:grpSpPr>
       <p:pic>
         <p:nvPicPr>
-          <p:cNvPr id="142" name="Content Placeholder 3" descr=""/>
+          <p:cNvPr id="143" name="Content Placeholder 3" descr=""/>
           <p:cNvPicPr/>
           <p:nvPr/>
         </p:nvPicPr>
@@ -9381,7 +9400,7 @@
         <p:spPr>
           <a:xfrm>
             <a:off x="1282320" y="72000"/>
-            <a:ext cx="6578640" cy="3507840"/>
+            <a:ext cx="6578280" cy="3507480"/>
           </a:xfrm>
           <a:prstGeom prst="rect">
             <a:avLst/>
@@ -9393,7 +9412,7 @@
       </p:pic>
       <p:pic>
         <p:nvPicPr>
-          <p:cNvPr id="143" name="Picture 4" descr=""/>
+          <p:cNvPr id="144" name="Picture 4" descr=""/>
           <p:cNvPicPr/>
           <p:nvPr/>
         </p:nvPicPr>
@@ -9404,7 +9423,7 @@
         <p:spPr>
           <a:xfrm>
             <a:off x="1282320" y="3277440"/>
-            <a:ext cx="6578640" cy="3507840"/>
+            <a:ext cx="6578280" cy="3507480"/>
           </a:xfrm>
           <a:prstGeom prst="rect">
             <a:avLst/>
@@ -9446,7 +9465,7 @@
       </p:grpSpPr>
       <p:pic>
         <p:nvPicPr>
-          <p:cNvPr id="144" name="Picture 12" descr=""/>
+          <p:cNvPr id="145" name="Picture 12" descr=""/>
           <p:cNvPicPr/>
           <p:nvPr/>
         </p:nvPicPr>
@@ -9457,7 +9476,7 @@
         <p:spPr>
           <a:xfrm>
             <a:off x="2668680" y="2127240"/>
-            <a:ext cx="6474600" cy="1899000"/>
+            <a:ext cx="6474240" cy="1898640"/>
           </a:xfrm>
           <a:prstGeom prst="rect">
             <a:avLst/>
@@ -9469,7 +9488,7 @@
       </p:pic>
       <p:sp>
         <p:nvSpPr>
-          <p:cNvPr id="145" name="PlaceHolder 1"/>
+          <p:cNvPr id="146" name="PlaceHolder 1"/>
           <p:cNvSpPr>
             <a:spLocks noGrp="1"/>
           </p:cNvSpPr>
@@ -9480,7 +9499,7 @@
         <p:spPr>
           <a:xfrm>
             <a:off x="628560" y="365040"/>
-            <a:ext cx="7886160" cy="1324800"/>
+            <a:ext cx="7885800" cy="1324440"/>
           </a:xfrm>
           <a:prstGeom prst="rect">
             <a:avLst/>
@@ -9542,7 +9561,7 @@
       </p:sp>
       <p:pic>
         <p:nvPicPr>
-          <p:cNvPr id="146" name="Picture 8" descr=""/>
+          <p:cNvPr id="147" name="Picture 8" descr=""/>
           <p:cNvPicPr/>
           <p:nvPr/>
         </p:nvPicPr>
@@ -9553,7 +9572,7 @@
         <p:spPr>
           <a:xfrm>
             <a:off x="348840" y="4545360"/>
-            <a:ext cx="8445240" cy="1703160"/>
+            <a:ext cx="8444880" cy="1702800"/>
           </a:xfrm>
           <a:prstGeom prst="rect">
             <a:avLst/>
@@ -9565,7 +9584,7 @@
       </p:pic>
       <p:pic>
         <p:nvPicPr>
-          <p:cNvPr id="147" name="Picture 14" descr=""/>
+          <p:cNvPr id="148" name="Picture 14" descr=""/>
           <p:cNvPicPr/>
           <p:nvPr/>
         </p:nvPicPr>
@@ -9576,7 +9595,7 @@
         <p:spPr>
           <a:xfrm>
             <a:off x="0" y="2127240"/>
-            <a:ext cx="6789600" cy="1851840"/>
+            <a:ext cx="6789240" cy="1851480"/>
           </a:xfrm>
           <a:prstGeom prst="rect">
             <a:avLst/>
@@ -9618,7 +9637,7 @@
       </p:grpSpPr>
       <p:sp>
         <p:nvSpPr>
-          <p:cNvPr id="148" name="PlaceHolder 1"/>
+          <p:cNvPr id="149" name="PlaceHolder 1"/>
           <p:cNvSpPr>
             <a:spLocks noGrp="1"/>
           </p:cNvSpPr>
@@ -9629,7 +9648,7 @@
         <p:spPr>
           <a:xfrm>
             <a:off x="359640" y="140040"/>
-            <a:ext cx="7819560" cy="776520"/>
+            <a:ext cx="7819200" cy="776160"/>
           </a:xfrm>
           <a:prstGeom prst="rect">
             <a:avLst/>
@@ -9682,7 +9701,7 @@
       </p:sp>
       <p:pic>
         <p:nvPicPr>
-          <p:cNvPr id="149" name="Picture 14" descr=""/>
+          <p:cNvPr id="150" name="Picture 14" descr=""/>
           <p:cNvPicPr/>
           <p:nvPr/>
         </p:nvPicPr>
@@ -9693,7 +9712,7 @@
         <p:spPr>
           <a:xfrm>
             <a:off x="108720" y="2148120"/>
-            <a:ext cx="3858840" cy="2009880"/>
+            <a:ext cx="3858480" cy="2009520"/>
           </a:xfrm>
           <a:prstGeom prst="rect">
             <a:avLst/>
@@ -9705,7 +9724,7 @@
       </p:pic>
       <p:pic>
         <p:nvPicPr>
-          <p:cNvPr id="150" name="Picture 20" descr=""/>
+          <p:cNvPr id="151" name="Picture 20" descr=""/>
           <p:cNvPicPr/>
           <p:nvPr/>
         </p:nvPicPr>
@@ -9716,7 +9735,7 @@
         <p:spPr>
           <a:xfrm>
             <a:off x="404640" y="1340640"/>
-            <a:ext cx="2742840" cy="332640"/>
+            <a:ext cx="2742480" cy="332280"/>
           </a:xfrm>
           <a:prstGeom prst="rect">
             <a:avLst/>
@@ -9728,7 +9747,7 @@
       </p:pic>
       <p:pic>
         <p:nvPicPr>
-          <p:cNvPr id="151" name="Picture 22" descr=""/>
+          <p:cNvPr id="152" name="Picture 22" descr=""/>
           <p:cNvPicPr/>
           <p:nvPr/>
         </p:nvPicPr>
@@ -9739,7 +9758,7 @@
         <p:spPr>
           <a:xfrm>
             <a:off x="252000" y="1618560"/>
-            <a:ext cx="2895120" cy="408960"/>
+            <a:ext cx="2894760" cy="408600"/>
           </a:xfrm>
           <a:prstGeom prst="rect">
             <a:avLst/>
@@ -9751,7 +9770,7 @@
       </p:pic>
       <p:pic>
         <p:nvPicPr>
-          <p:cNvPr id="152" name="Picture 26" descr=""/>
+          <p:cNvPr id="153" name="Picture 26" descr=""/>
           <p:cNvPicPr/>
           <p:nvPr/>
         </p:nvPicPr>
@@ -9762,7 +9781,7 @@
         <p:spPr>
           <a:xfrm>
             <a:off x="5391720" y="1369800"/>
-            <a:ext cx="2333160" cy="237600"/>
+            <a:ext cx="2332800" cy="237240"/>
           </a:xfrm>
           <a:prstGeom prst="rect">
             <a:avLst/>
@@ -9774,7 +9793,7 @@
       </p:pic>
       <p:pic>
         <p:nvPicPr>
-          <p:cNvPr id="153" name="Picture 28" descr=""/>
+          <p:cNvPr id="154" name="Picture 28" descr=""/>
           <p:cNvPicPr/>
           <p:nvPr/>
         </p:nvPicPr>
@@ -9785,7 +9804,7 @@
         <p:spPr>
           <a:xfrm>
             <a:off x="5132160" y="1610640"/>
-            <a:ext cx="2942280" cy="408960"/>
+            <a:ext cx="2941920" cy="408600"/>
           </a:xfrm>
           <a:prstGeom prst="rect">
             <a:avLst/>
@@ -9797,7 +9816,7 @@
       </p:pic>
       <p:pic>
         <p:nvPicPr>
-          <p:cNvPr id="154" name="Picture 30" descr=""/>
+          <p:cNvPr id="155" name="Picture 30" descr=""/>
           <p:cNvPicPr/>
           <p:nvPr/>
         </p:nvPicPr>
@@ -9808,7 +9827,7 @@
         <p:spPr>
           <a:xfrm>
             <a:off x="4987440" y="2200680"/>
-            <a:ext cx="3476520" cy="1856880"/>
+            <a:ext cx="3476160" cy="1856520"/>
           </a:xfrm>
           <a:prstGeom prst="rect">
             <a:avLst/>
@@ -9820,7 +9839,7 @@
       </p:pic>
       <p:pic>
         <p:nvPicPr>
-          <p:cNvPr id="155" name="Picture 34" descr=""/>
+          <p:cNvPr id="156" name="Picture 34" descr=""/>
           <p:cNvPicPr/>
           <p:nvPr/>
         </p:nvPicPr>
@@ -9831,7 +9850,7 @@
         <p:spPr>
           <a:xfrm>
             <a:off x="3102840" y="4276800"/>
-            <a:ext cx="2333160" cy="180360"/>
+            <a:ext cx="2332800" cy="180000"/>
           </a:xfrm>
           <a:prstGeom prst="rect">
             <a:avLst/>
@@ -9843,7 +9862,7 @@
       </p:pic>
       <p:pic>
         <p:nvPicPr>
-          <p:cNvPr id="156" name="Picture 36" descr=""/>
+          <p:cNvPr id="157" name="Picture 36" descr=""/>
           <p:cNvPicPr/>
           <p:nvPr/>
         </p:nvPicPr>
@@ -9854,7 +9873,7 @@
         <p:spPr>
           <a:xfrm>
             <a:off x="3148200" y="4460760"/>
-            <a:ext cx="2533320" cy="342360"/>
+            <a:ext cx="2532960" cy="342000"/>
           </a:xfrm>
           <a:prstGeom prst="rect">
             <a:avLst/>
@@ -9866,7 +9885,7 @@
       </p:pic>
       <p:pic>
         <p:nvPicPr>
-          <p:cNvPr id="157" name="Picture 38" descr=""/>
+          <p:cNvPr id="158" name="Picture 38" descr=""/>
           <p:cNvPicPr/>
           <p:nvPr/>
         </p:nvPicPr>
@@ -9877,7 +9896,7 @@
         <p:spPr>
           <a:xfrm>
             <a:off x="2683800" y="4770000"/>
-            <a:ext cx="3428640" cy="1856880"/>
+            <a:ext cx="3428280" cy="1856520"/>
           </a:xfrm>
           <a:prstGeom prst="rect">
             <a:avLst/>
@@ -9919,7 +9938,7 @@
       </p:grpSpPr>
       <p:pic>
         <p:nvPicPr>
-          <p:cNvPr id="158" name="Picture 11" descr=""/>
+          <p:cNvPr id="159" name="Picture 11" descr=""/>
           <p:cNvPicPr/>
           <p:nvPr/>
         </p:nvPicPr>
@@ -9930,7 +9949,7 @@
         <p:spPr>
           <a:xfrm>
             <a:off x="146880" y="3387600"/>
-            <a:ext cx="4331160" cy="2586240"/>
+            <a:ext cx="4330800" cy="2585880"/>
           </a:xfrm>
           <a:prstGeom prst="rect">
             <a:avLst/>
@@ -9942,7 +9961,7 @@
       </p:pic>
       <p:pic>
         <p:nvPicPr>
-          <p:cNvPr id="159" name="Picture 13" descr=""/>
+          <p:cNvPr id="160" name="Picture 13" descr=""/>
           <p:cNvPicPr/>
           <p:nvPr/>
         </p:nvPicPr>
@@ -9953,7 +9972,7 @@
         <p:spPr>
           <a:xfrm>
             <a:off x="124920" y="871200"/>
-            <a:ext cx="4353120" cy="2515680"/>
+            <a:ext cx="4352760" cy="2515320"/>
           </a:xfrm>
           <a:prstGeom prst="rect">
             <a:avLst/>
@@ -9965,7 +9984,7 @@
       </p:pic>
       <p:sp>
         <p:nvSpPr>
-          <p:cNvPr id="160" name="PlaceHolder 1"/>
+          <p:cNvPr id="161" name="PlaceHolder 1"/>
           <p:cNvSpPr>
             <a:spLocks noGrp="1"/>
           </p:cNvSpPr>
@@ -9976,7 +9995,7 @@
         <p:spPr>
           <a:xfrm>
             <a:off x="146880" y="248760"/>
-            <a:ext cx="3065400" cy="609480"/>
+            <a:ext cx="3065040" cy="609120"/>
           </a:xfrm>
           <a:prstGeom prst="rect">
             <a:avLst/>
@@ -10020,7 +10039,7 @@
       </p:sp>
       <p:pic>
         <p:nvPicPr>
-          <p:cNvPr id="161" name="Picture 15" descr=""/>
+          <p:cNvPr id="162" name="Picture 15" descr=""/>
           <p:cNvPicPr/>
           <p:nvPr/>
         </p:nvPicPr>
@@ -10031,7 +10050,7 @@
         <p:spPr>
           <a:xfrm>
             <a:off x="4478760" y="1959480"/>
-            <a:ext cx="4571280" cy="2720880"/>
+            <a:ext cx="4570920" cy="2720520"/>
           </a:xfrm>
           <a:prstGeom prst="rect">
             <a:avLst/>
@@ -10073,23 +10092,29 @@
       </p:grpSpPr>
       <p:sp>
         <p:nvSpPr>
-          <p:cNvPr id="162" name="PlaceHolder 4"/>
-          <p:cNvSpPr txBox="1"/>
+          <p:cNvPr id="163" name="PlaceHolder 4"/>
+          <p:cNvSpPr/>
           <p:nvPr/>
         </p:nvSpPr>
         <p:spPr>
           <a:xfrm>
             <a:off x="147240" y="249120"/>
-            <a:ext cx="3589560" cy="609480"/>
-          </a:xfrm>
-          <a:prstGeom prst="rect">
-            <a:avLst/>
-          </a:prstGeom>
-          <a:noFill/>
-          <a:ln w="0">
-            <a:noFill/>
-          </a:ln>
-        </p:spPr>
+            <a:ext cx="3589200" cy="609120"/>
+          </a:xfrm>
+          <a:prstGeom prst="rect">
+            <a:avLst/>
+          </a:prstGeom>
+          <a:noFill/>
+          <a:ln w="0">
+            <a:noFill/>
+          </a:ln>
+        </p:spPr>
+        <p:style>
+          <a:lnRef idx="0"/>
+          <a:fillRef idx="0"/>
+          <a:effectRef idx="0"/>
+          <a:fontRef idx="minor"/>
+        </p:style>
         <p:txBody>
           <a:bodyPr lIns="0" rIns="0" tIns="0" bIns="0" anchor="ctr">
             <a:normAutofit fontScale="71000"/>
@@ -10123,7 +10148,7 @@
       </p:sp>
       <p:pic>
         <p:nvPicPr>
-          <p:cNvPr id="163" name="" descr=""/>
+          <p:cNvPr id="164" name="" descr=""/>
           <p:cNvPicPr/>
           <p:nvPr/>
         </p:nvPicPr>
@@ -10134,7 +10159,7 @@
         <p:spPr>
           <a:xfrm>
             <a:off x="1242000" y="989280"/>
-            <a:ext cx="6660000" cy="5223960"/>
+            <a:ext cx="6659640" cy="5223600"/>
           </a:xfrm>
           <a:prstGeom prst="rect">
             <a:avLst/>
@@ -10176,7 +10201,7 @@
       </p:grpSpPr>
       <p:pic>
         <p:nvPicPr>
-          <p:cNvPr id="164" name="Picture 10" descr=""/>
+          <p:cNvPr id="165" name="Picture 10" descr=""/>
           <p:cNvPicPr/>
           <p:nvPr/>
         </p:nvPicPr>
@@ -10187,7 +10212,7 @@
         <p:spPr>
           <a:xfrm>
             <a:off x="12600" y="916560"/>
-            <a:ext cx="5313600" cy="2653560"/>
+            <a:ext cx="5313240" cy="2653200"/>
           </a:xfrm>
           <a:prstGeom prst="rect">
             <a:avLst/>
@@ -10199,7 +10224,7 @@
       </p:pic>
       <p:sp>
         <p:nvSpPr>
-          <p:cNvPr id="165" name="PlaceHolder 1"/>
+          <p:cNvPr id="166" name="PlaceHolder 1"/>
           <p:cNvSpPr>
             <a:spLocks noGrp="1"/>
           </p:cNvSpPr>
@@ -10210,7 +10235,7 @@
         <p:spPr>
           <a:xfrm>
             <a:off x="12600" y="147960"/>
-            <a:ext cx="3936600" cy="657000"/>
+            <a:ext cx="3936240" cy="656640"/>
           </a:xfrm>
           <a:prstGeom prst="rect">
             <a:avLst/>
@@ -10254,7 +10279,7 @@
       </p:sp>
       <p:pic>
         <p:nvPicPr>
-          <p:cNvPr id="166" name="Picture 12" descr=""/>
+          <p:cNvPr id="167" name="Picture 12" descr=""/>
           <p:cNvPicPr/>
           <p:nvPr/>
         </p:nvPicPr>
@@ -10265,7 +10290,7 @@
         <p:spPr>
           <a:xfrm>
             <a:off x="5326920" y="2375640"/>
-            <a:ext cx="3740400" cy="2496960"/>
+            <a:ext cx="3740040" cy="2496600"/>
           </a:xfrm>
           <a:prstGeom prst="rect">
             <a:avLst/>
@@ -10277,7 +10302,7 @@
       </p:pic>
       <p:pic>
         <p:nvPicPr>
-          <p:cNvPr id="167" name="Picture 14" descr=""/>
+          <p:cNvPr id="168" name="Picture 14" descr=""/>
           <p:cNvPicPr/>
           <p:nvPr/>
         </p:nvPicPr>
@@ -10288,7 +10313,7 @@
         <p:spPr>
           <a:xfrm>
             <a:off x="203400" y="3493440"/>
-            <a:ext cx="5122800" cy="2558160"/>
+            <a:ext cx="5122440" cy="2557800"/>
           </a:xfrm>
           <a:prstGeom prst="rect">
             <a:avLst/>
@@ -10330,7 +10355,7 @@
       </p:grpSpPr>
       <p:pic>
         <p:nvPicPr>
-          <p:cNvPr id="168" name="Picture 6" descr=""/>
+          <p:cNvPr id="169" name="Picture 6" descr=""/>
           <p:cNvPicPr/>
           <p:nvPr/>
         </p:nvPicPr>
@@ -10341,7 +10366,7 @@
         <p:spPr>
           <a:xfrm>
             <a:off x="135360" y="835200"/>
-            <a:ext cx="5184000" cy="2592000"/>
+            <a:ext cx="5183640" cy="2591640"/>
           </a:xfrm>
           <a:prstGeom prst="rect">
             <a:avLst/>
@@ -10353,7 +10378,7 @@
       </p:pic>
       <p:sp>
         <p:nvSpPr>
-          <p:cNvPr id="169" name="PlaceHolder 1"/>
+          <p:cNvPr id="170" name="PlaceHolder 1"/>
           <p:cNvSpPr>
             <a:spLocks noGrp="1"/>
           </p:cNvSpPr>
@@ -10364,7 +10389,7 @@
         <p:spPr>
           <a:xfrm>
             <a:off x="0" y="114840"/>
-            <a:ext cx="5319360" cy="528480"/>
+            <a:ext cx="5319000" cy="528120"/>
           </a:xfrm>
           <a:prstGeom prst="rect">
             <a:avLst/>
@@ -10376,7 +10401,7 @@
         </p:spPr>
         <p:txBody>
           <a:bodyPr lIns="90000" rIns="90000" tIns="45000" bIns="45000" anchor="ctr">
-            <a:normAutofit fontScale="77000"/>
+            <a:normAutofit fontScale="76000"/>
           </a:bodyPr>
           <a:p>
             <a:pPr indent="0">
@@ -10408,7 +10433,7 @@
       </p:sp>
       <p:pic>
         <p:nvPicPr>
-          <p:cNvPr id="170" name="Picture 4" descr=""/>
+          <p:cNvPr id="171" name="Picture 4" descr=""/>
           <p:cNvPicPr/>
           <p:nvPr/>
         </p:nvPicPr>
@@ -10419,7 +10444,7 @@
         <p:spPr>
           <a:xfrm>
             <a:off x="65880" y="3707640"/>
-            <a:ext cx="5184000" cy="2592000"/>
+            <a:ext cx="5183640" cy="2591640"/>
           </a:xfrm>
           <a:prstGeom prst="rect">
             <a:avLst/>
@@ -10431,7 +10456,7 @@
       </p:pic>
       <p:pic>
         <p:nvPicPr>
-          <p:cNvPr id="171" name="" descr=""/>
+          <p:cNvPr id="172" name="" descr=""/>
           <p:cNvPicPr/>
           <p:nvPr/>
         </p:nvPicPr>
@@ -10442,7 +10467,7 @@
         <p:spPr>
           <a:xfrm>
             <a:off x="5287320" y="2228400"/>
-            <a:ext cx="3816000" cy="2880000"/>
+            <a:ext cx="3815640" cy="2879640"/>
           </a:xfrm>
           <a:prstGeom prst="rect">
             <a:avLst/>
@@ -10484,23 +10509,29 @@
       </p:grpSpPr>
       <p:sp>
         <p:nvSpPr>
-          <p:cNvPr id="172" name="PlaceHolder 3"/>
-          <p:cNvSpPr txBox="1"/>
+          <p:cNvPr id="173" name="PlaceHolder 3"/>
+          <p:cNvSpPr/>
           <p:nvPr/>
         </p:nvSpPr>
         <p:spPr>
           <a:xfrm>
             <a:off x="12960" y="148320"/>
-            <a:ext cx="3936600" cy="657000"/>
-          </a:xfrm>
-          <a:prstGeom prst="rect">
-            <a:avLst/>
-          </a:prstGeom>
-          <a:noFill/>
-          <a:ln w="0">
-            <a:noFill/>
-          </a:ln>
-        </p:spPr>
+            <a:ext cx="3936240" cy="656640"/>
+          </a:xfrm>
+          <a:prstGeom prst="rect">
+            <a:avLst/>
+          </a:prstGeom>
+          <a:noFill/>
+          <a:ln w="0">
+            <a:noFill/>
+          </a:ln>
+        </p:spPr>
+        <p:style>
+          <a:lnRef idx="0"/>
+          <a:fillRef idx="0"/>
+          <a:effectRef idx="0"/>
+          <a:fontRef idx="minor"/>
+        </p:style>
         <p:txBody>
           <a:bodyPr lIns="90000" rIns="90000" tIns="45000" bIns="45000" anchor="ctr">
             <a:noAutofit/>
@@ -10534,7 +10565,7 @@
       </p:sp>
       <p:pic>
         <p:nvPicPr>
-          <p:cNvPr id="173" name="" descr=""/>
+          <p:cNvPr id="174" name="" descr=""/>
           <p:cNvPicPr/>
           <p:nvPr/>
         </p:nvPicPr>
@@ -10545,30 +10576,7 @@
         <p:spPr>
           <a:xfrm>
             <a:off x="117360" y="801000"/>
-            <a:ext cx="5184000" cy="2592000"/>
-          </a:xfrm>
-          <a:prstGeom prst="rect">
-            <a:avLst/>
-          </a:prstGeom>
-          <a:ln w="0">
-            <a:noFill/>
-          </a:ln>
-        </p:spPr>
-      </p:pic>
-      <p:pic>
-        <p:nvPicPr>
-          <p:cNvPr id="174" name="" descr=""/>
-          <p:cNvPicPr/>
-          <p:nvPr/>
-        </p:nvPicPr>
-        <p:blipFill>
-          <a:blip r:embed="rId2"/>
-          <a:stretch/>
-        </p:blipFill>
-        <p:spPr>
-          <a:xfrm>
-            <a:off x="132120" y="3600000"/>
-            <a:ext cx="5184000" cy="2592000"/>
+            <a:ext cx="5183640" cy="2591640"/>
           </a:xfrm>
           <a:prstGeom prst="rect">
             <a:avLst/>
@@ -10585,13 +10593,36 @@
           <p:nvPr/>
         </p:nvPicPr>
         <p:blipFill>
+          <a:blip r:embed="rId2"/>
+          <a:stretch/>
+        </p:blipFill>
+        <p:spPr>
+          <a:xfrm>
+            <a:off x="132120" y="3600000"/>
+            <a:ext cx="5183640" cy="2591640"/>
+          </a:xfrm>
+          <a:prstGeom prst="rect">
+            <a:avLst/>
+          </a:prstGeom>
+          <a:ln w="0">
+            <a:noFill/>
+          </a:ln>
+        </p:spPr>
+      </p:pic>
+      <p:pic>
+        <p:nvPicPr>
+          <p:cNvPr id="176" name="" descr=""/>
+          <p:cNvPicPr/>
+          <p:nvPr/>
+        </p:nvPicPr>
+        <p:blipFill>
           <a:blip r:embed="rId3"/>
           <a:stretch/>
         </p:blipFill>
         <p:spPr>
           <a:xfrm>
             <a:off x="5228640" y="2058480"/>
-            <a:ext cx="3816000" cy="2880000"/>
+            <a:ext cx="3815640" cy="2879640"/>
           </a:xfrm>
           <a:prstGeom prst="rect">
             <a:avLst/>
@@ -10633,7 +10664,7 @@
       </p:grpSpPr>
       <p:pic>
         <p:nvPicPr>
-          <p:cNvPr id="176" name="Picture 4" descr=""/>
+          <p:cNvPr id="177" name="Picture 4" descr=""/>
           <p:cNvPicPr/>
           <p:nvPr/>
         </p:nvPicPr>
@@ -10644,7 +10675,7 @@
         <p:spPr>
           <a:xfrm>
             <a:off x="62640" y="1077120"/>
-            <a:ext cx="5184000" cy="2592000"/>
+            <a:ext cx="5183640" cy="2591640"/>
           </a:xfrm>
           <a:prstGeom prst="rect">
             <a:avLst/>
@@ -10656,7 +10687,7 @@
       </p:pic>
       <p:pic>
         <p:nvPicPr>
-          <p:cNvPr id="177" name="Picture 8" descr=""/>
+          <p:cNvPr id="178" name="Picture 8" descr=""/>
           <p:cNvPicPr/>
           <p:nvPr/>
         </p:nvPicPr>
@@ -10667,7 +10698,7 @@
         <p:spPr>
           <a:xfrm>
             <a:off x="84960" y="3952440"/>
-            <a:ext cx="5184000" cy="2592000"/>
+            <a:ext cx="5183640" cy="2591640"/>
           </a:xfrm>
           <a:prstGeom prst="rect">
             <a:avLst/>
@@ -10679,7 +10710,7 @@
       </p:pic>
       <p:pic>
         <p:nvPicPr>
-          <p:cNvPr id="178" name="Picture 10" descr=""/>
+          <p:cNvPr id="179" name="Picture 10" descr=""/>
           <p:cNvPicPr/>
           <p:nvPr/>
         </p:nvPicPr>
@@ -10690,7 +10721,7 @@
         <p:spPr>
           <a:xfrm>
             <a:off x="5293080" y="1893600"/>
-            <a:ext cx="3803760" cy="2858400"/>
+            <a:ext cx="3803400" cy="2858040"/>
           </a:xfrm>
           <a:prstGeom prst="rect">
             <a:avLst/>
@@ -10702,7 +10733,7 @@
       </p:pic>
       <p:sp>
         <p:nvSpPr>
-          <p:cNvPr id="179" name="PlaceHolder 1"/>
+          <p:cNvPr id="180" name="PlaceHolder 1"/>
           <p:cNvSpPr>
             <a:spLocks noGrp="1"/>
           </p:cNvSpPr>
@@ -10713,7 +10744,7 @@
         <p:spPr>
           <a:xfrm>
             <a:off x="151560" y="177120"/>
-            <a:ext cx="3328920" cy="679320"/>
+            <a:ext cx="3328560" cy="678960"/>
           </a:xfrm>
           <a:prstGeom prst="rect">
             <a:avLst/>
@@ -10787,7 +10818,7 @@
       </p:grpSpPr>
       <p:sp>
         <p:nvSpPr>
-          <p:cNvPr id="180" name="PlaceHolder 1"/>
+          <p:cNvPr id="181" name="PlaceHolder 1"/>
           <p:cNvSpPr>
             <a:spLocks noGrp="1"/>
           </p:cNvSpPr>
@@ -10798,7 +10829,7 @@
         <p:spPr>
           <a:xfrm>
             <a:off x="628560" y="365040"/>
-            <a:ext cx="7886160" cy="1324800"/>
+            <a:ext cx="7885800" cy="1324440"/>
           </a:xfrm>
           <a:prstGeom prst="rect">
             <a:avLst/>
@@ -10842,7 +10873,7 @@
       </p:sp>
       <p:pic>
         <p:nvPicPr>
-          <p:cNvPr id="181" name="Picture 9" descr=""/>
+          <p:cNvPr id="182" name="Picture 9" descr=""/>
           <p:cNvPicPr/>
           <p:nvPr/>
         </p:nvPicPr>
@@ -10853,7 +10884,7 @@
         <p:spPr>
           <a:xfrm>
             <a:off x="79200" y="1438560"/>
-            <a:ext cx="8985240" cy="4916160"/>
+            <a:ext cx="8984880" cy="4915800"/>
           </a:xfrm>
           <a:prstGeom prst="rect">
             <a:avLst/>
@@ -10895,7 +10926,7 @@
       </p:grpSpPr>
       <p:sp>
         <p:nvSpPr>
-          <p:cNvPr id="125" name="PlaceHolder 1"/>
+          <p:cNvPr id="126" name="PlaceHolder 1"/>
           <p:cNvSpPr>
             <a:spLocks noGrp="1"/>
           </p:cNvSpPr>
@@ -10906,7 +10937,7 @@
         <p:spPr>
           <a:xfrm>
             <a:off x="302760" y="168480"/>
-            <a:ext cx="2011320" cy="1071360"/>
+            <a:ext cx="2010960" cy="1071000"/>
           </a:xfrm>
           <a:prstGeom prst="rect">
             <a:avLst/>
@@ -10950,21 +10981,21 @@
       </p:sp>
       <p:grpSp>
         <p:nvGrpSpPr>
-          <p:cNvPr id="126" name=""/>
+          <p:cNvPr id="127" name=""/>
           <p:cNvGrpSpPr/>
           <p:nvPr/>
         </p:nvGrpSpPr>
         <p:grpSpPr>
           <a:xfrm>
             <a:off x="2552400" y="1618560"/>
-            <a:ext cx="4039200" cy="4750560"/>
+            <a:ext cx="4038840" cy="4750200"/>
             <a:chOff x="2552400" y="1618560"/>
-            <a:chExt cx="4039200" cy="4750560"/>
+            <a:chExt cx="4038840" cy="4750200"/>
           </a:xfrm>
         </p:grpSpPr>
         <p:pic>
           <p:nvPicPr>
-            <p:cNvPr id="127" name="Picture 5" descr=""/>
+            <p:cNvPr id="128" name="Picture 5" descr=""/>
             <p:cNvPicPr/>
             <p:nvPr/>
           </p:nvPicPr>
@@ -10975,7 +11006,7 @@
           <p:spPr>
             <a:xfrm>
               <a:off x="2552400" y="1618560"/>
-              <a:ext cx="2383560" cy="4750560"/>
+              <a:ext cx="2383200" cy="4750200"/>
             </a:xfrm>
             <a:prstGeom prst="rect">
               <a:avLst/>
@@ -10987,7 +11018,7 @@
         </p:pic>
         <p:pic>
           <p:nvPicPr>
-            <p:cNvPr id="128" name="Picture 7" descr=""/>
+            <p:cNvPr id="129" name="Picture 7" descr=""/>
             <p:cNvPicPr/>
             <p:nvPr/>
           </p:nvPicPr>
@@ -10998,7 +11029,7 @@
           <p:spPr>
             <a:xfrm>
               <a:off x="5039280" y="2229480"/>
-              <a:ext cx="1552320" cy="2398320"/>
+              <a:ext cx="1551960" cy="2397960"/>
             </a:xfrm>
             <a:prstGeom prst="rect">
               <a:avLst/>
@@ -11011,14 +11042,14 @@
       </p:grpSp>
       <p:sp>
         <p:nvSpPr>
-          <p:cNvPr id="129" name=""/>
+          <p:cNvPr id="130" name=""/>
           <p:cNvSpPr/>
           <p:nvPr/>
         </p:nvSpPr>
         <p:spPr>
           <a:xfrm>
             <a:off x="2447280" y="4110480"/>
-            <a:ext cx="1443600" cy="442440"/>
+            <a:ext cx="1443240" cy="442080"/>
           </a:xfrm>
           <a:prstGeom prst="rect">
             <a:avLst/>
@@ -11089,7 +11120,7 @@
       </p:grpSpPr>
       <p:pic>
         <p:nvPicPr>
-          <p:cNvPr id="182" name="Picture 6" descr=""/>
+          <p:cNvPr id="183" name="Picture 6" descr=""/>
           <p:cNvPicPr/>
           <p:nvPr/>
         </p:nvPicPr>
@@ -11100,7 +11131,7 @@
         <p:spPr>
           <a:xfrm>
             <a:off x="50760" y="1133640"/>
-            <a:ext cx="9041760" cy="4590000"/>
+            <a:ext cx="9041400" cy="4589640"/>
           </a:xfrm>
           <a:prstGeom prst="rect">
             <a:avLst/>
@@ -11142,7 +11173,7 @@
       </p:grpSpPr>
       <p:pic>
         <p:nvPicPr>
-          <p:cNvPr id="183" name="Picture 5" descr=""/>
+          <p:cNvPr id="184" name="Picture 5" descr=""/>
           <p:cNvPicPr/>
           <p:nvPr/>
         </p:nvPicPr>
@@ -11153,7 +11184,7 @@
         <p:spPr>
           <a:xfrm>
             <a:off x="65160" y="1318680"/>
-            <a:ext cx="9078120" cy="4388400"/>
+            <a:ext cx="9077760" cy="4388040"/>
           </a:xfrm>
           <a:prstGeom prst="rect">
             <a:avLst/>
@@ -11195,7 +11226,7 @@
       </p:grpSpPr>
       <p:pic>
         <p:nvPicPr>
-          <p:cNvPr id="184" name="Picture 3" descr=""/>
+          <p:cNvPr id="185" name="Picture 3" descr=""/>
           <p:cNvPicPr/>
           <p:nvPr/>
         </p:nvPicPr>
@@ -11206,7 +11237,7 @@
         <p:spPr>
           <a:xfrm>
             <a:off x="74520" y="932400"/>
-            <a:ext cx="8994240" cy="4692240"/>
+            <a:ext cx="8993880" cy="4691880"/>
           </a:xfrm>
           <a:prstGeom prst="rect">
             <a:avLst/>
@@ -11248,7 +11279,7 @@
       </p:grpSpPr>
       <p:pic>
         <p:nvPicPr>
-          <p:cNvPr id="185" name="Picture 3" descr=""/>
+          <p:cNvPr id="186" name="Picture 3" descr=""/>
           <p:cNvPicPr/>
           <p:nvPr/>
         </p:nvPicPr>
@@ -11259,7 +11290,7 @@
         <p:spPr>
           <a:xfrm>
             <a:off x="2171160" y="1015200"/>
-            <a:ext cx="4800600" cy="5006880"/>
+            <a:ext cx="4800240" cy="5006520"/>
           </a:xfrm>
           <a:prstGeom prst="rect">
             <a:avLst/>
@@ -11301,14 +11332,14 @@
       </p:grpSpPr>
       <p:sp>
         <p:nvSpPr>
-          <p:cNvPr id="186" name="Content Placeholder 2"/>
+          <p:cNvPr id="187" name="Content Placeholder 2"/>
           <p:cNvSpPr/>
           <p:nvPr/>
         </p:nvSpPr>
         <p:spPr>
           <a:xfrm>
             <a:off x="1671120" y="1894320"/>
-            <a:ext cx="5801760" cy="1432080"/>
+            <a:ext cx="5801400" cy="1431720"/>
           </a:xfrm>
           <a:prstGeom prst="rect">
             <a:avLst/>
@@ -11439,7 +11470,7 @@
       </p:grpSpPr>
       <p:pic>
         <p:nvPicPr>
-          <p:cNvPr id="130" name="Content Placeholder 4" descr=""/>
+          <p:cNvPr id="131" name="Content Placeholder 4" descr=""/>
           <p:cNvPicPr/>
           <p:nvPr/>
         </p:nvPicPr>
@@ -11450,7 +11481,7 @@
         <p:spPr>
           <a:xfrm>
             <a:off x="46800" y="1269000"/>
-            <a:ext cx="8999640" cy="4319640"/>
+            <a:ext cx="8999280" cy="4319280"/>
           </a:xfrm>
           <a:prstGeom prst="rect">
             <a:avLst/>
@@ -11492,7 +11523,7 @@
       </p:grpSpPr>
       <p:pic>
         <p:nvPicPr>
-          <p:cNvPr id="131" name="Content Placeholder 4" descr=""/>
+          <p:cNvPr id="132" name="Content Placeholder 4" descr=""/>
           <p:cNvPicPr/>
           <p:nvPr/>
         </p:nvPicPr>
@@ -11503,7 +11534,7 @@
         <p:spPr>
           <a:xfrm>
             <a:off x="5400" y="1269000"/>
-            <a:ext cx="8999640" cy="4319640"/>
+            <a:ext cx="8999280" cy="4319280"/>
           </a:xfrm>
           <a:prstGeom prst="rect">
             <a:avLst/>
@@ -11545,7 +11576,7 @@
       </p:grpSpPr>
       <p:pic>
         <p:nvPicPr>
-          <p:cNvPr id="132" name="Content Placeholder 3" descr=""/>
+          <p:cNvPr id="133" name="Content Placeholder 3" descr=""/>
           <p:cNvPicPr/>
           <p:nvPr/>
         </p:nvPicPr>
@@ -11556,7 +11587,7 @@
         <p:spPr>
           <a:xfrm>
             <a:off x="72000" y="1179000"/>
-            <a:ext cx="8999640" cy="4499640"/>
+            <a:ext cx="8999280" cy="4499280"/>
           </a:xfrm>
           <a:prstGeom prst="rect">
             <a:avLst/>
@@ -11598,7 +11629,7 @@
       </p:grpSpPr>
       <p:pic>
         <p:nvPicPr>
-          <p:cNvPr id="133" name="Content Placeholder 3" descr=""/>
+          <p:cNvPr id="134" name="Content Placeholder 3" descr=""/>
           <p:cNvPicPr/>
           <p:nvPr/>
         </p:nvPicPr>
@@ -11609,7 +11640,7 @@
         <p:spPr>
           <a:xfrm>
             <a:off x="65520" y="1179000"/>
-            <a:ext cx="8999640" cy="4499640"/>
+            <a:ext cx="8999280" cy="4499280"/>
           </a:xfrm>
           <a:prstGeom prst="rect">
             <a:avLst/>
@@ -11651,7 +11682,7 @@
       </p:grpSpPr>
       <p:pic>
         <p:nvPicPr>
-          <p:cNvPr id="134" name="Picture 4" descr=""/>
+          <p:cNvPr id="135" name="Picture 4" descr=""/>
           <p:cNvPicPr/>
           <p:nvPr/>
         </p:nvPicPr>
@@ -11662,7 +11693,7 @@
         <p:spPr>
           <a:xfrm>
             <a:off x="1421640" y="278640"/>
-            <a:ext cx="6300360" cy="6300360"/>
+            <a:ext cx="6300000" cy="6300000"/>
           </a:xfrm>
           <a:prstGeom prst="rect">
             <a:avLst/>
@@ -11704,7 +11735,7 @@
       </p:grpSpPr>
       <p:sp>
         <p:nvSpPr>
-          <p:cNvPr id="135" name="PlaceHolder 1"/>
+          <p:cNvPr id="136" name="PlaceHolder 1"/>
           <p:cNvSpPr>
             <a:spLocks noGrp="1"/>
           </p:cNvSpPr>
@@ -11715,7 +11746,7 @@
         <p:spPr>
           <a:xfrm>
             <a:off x="180000" y="379800"/>
-            <a:ext cx="5442120" cy="378000"/>
+            <a:ext cx="5441760" cy="377640"/>
           </a:xfrm>
           <a:prstGeom prst="rect">
             <a:avLst/>
@@ -11768,21 +11799,21 @@
       </p:sp>
       <p:grpSp>
         <p:nvGrpSpPr>
-          <p:cNvPr id="136" name=""/>
+          <p:cNvPr id="137" name=""/>
           <p:cNvGrpSpPr/>
           <p:nvPr/>
         </p:nvGrpSpPr>
         <p:grpSpPr>
           <a:xfrm>
             <a:off x="1394640" y="758520"/>
-            <a:ext cx="6354720" cy="6098760"/>
+            <a:ext cx="6354360" cy="6098400"/>
             <a:chOff x="1394640" y="758520"/>
-            <a:chExt cx="6354720" cy="6098760"/>
+            <a:chExt cx="6354360" cy="6098400"/>
           </a:xfrm>
         </p:grpSpPr>
         <p:pic>
           <p:nvPicPr>
-            <p:cNvPr id="137" name="Content Placeholder 18" descr=""/>
+            <p:cNvPr id="138" name="Content Placeholder 18" descr=""/>
             <p:cNvPicPr/>
             <p:nvPr/>
           </p:nvPicPr>
@@ -11793,7 +11824,7 @@
           <p:spPr>
             <a:xfrm>
               <a:off x="1394640" y="758520"/>
-              <a:ext cx="6354720" cy="3388320"/>
+              <a:ext cx="6354360" cy="3387960"/>
             </a:xfrm>
             <a:prstGeom prst="rect">
               <a:avLst/>
@@ -11805,7 +11836,7 @@
         </p:pic>
         <p:pic>
           <p:nvPicPr>
-            <p:cNvPr id="138" name="Picture 20" descr=""/>
+            <p:cNvPr id="139" name="Picture 20" descr=""/>
             <p:cNvPicPr/>
             <p:nvPr/>
           </p:nvPicPr>
@@ -11816,7 +11847,7 @@
           <p:spPr>
             <a:xfrm>
               <a:off x="1394640" y="3468960"/>
-              <a:ext cx="6354720" cy="3388320"/>
+              <a:ext cx="6354360" cy="3387960"/>
             </a:xfrm>
             <a:prstGeom prst="rect">
               <a:avLst/>
@@ -11859,21 +11890,21 @@
       </p:grpSpPr>
       <p:grpSp>
         <p:nvGrpSpPr>
-          <p:cNvPr id="139" name=""/>
+          <p:cNvPr id="140" name=""/>
           <p:cNvGrpSpPr/>
           <p:nvPr/>
         </p:nvGrpSpPr>
         <p:grpSpPr>
           <a:xfrm>
             <a:off x="1260000" y="18000"/>
-            <a:ext cx="6624000" cy="6886080"/>
+            <a:ext cx="6623640" cy="6885720"/>
             <a:chOff x="1260000" y="18000"/>
-            <a:chExt cx="6624000" cy="6886080"/>
+            <a:chExt cx="6623640" cy="6885720"/>
           </a:xfrm>
         </p:grpSpPr>
         <p:pic>
           <p:nvPicPr>
-            <p:cNvPr id="140" name="Content Placeholder 3" descr=""/>
+            <p:cNvPr id="141" name="Content Placeholder 3" descr=""/>
             <p:cNvPicPr/>
             <p:nvPr/>
           </p:nvPicPr>
@@ -11884,7 +11915,7 @@
           <p:spPr>
             <a:xfrm>
               <a:off x="1260000" y="18000"/>
-              <a:ext cx="6612480" cy="3525840"/>
+              <a:ext cx="6612120" cy="3525480"/>
             </a:xfrm>
             <a:prstGeom prst="rect">
               <a:avLst/>
@@ -11896,7 +11927,7 @@
         </p:pic>
         <p:pic>
           <p:nvPicPr>
-            <p:cNvPr id="141" name="Picture 4" descr=""/>
+            <p:cNvPr id="142" name="Picture 4" descr=""/>
             <p:cNvPicPr/>
             <p:nvPr/>
           </p:nvPicPr>
@@ -11907,7 +11938,7 @@
           <p:spPr>
             <a:xfrm>
               <a:off x="1271520" y="3378240"/>
-              <a:ext cx="6612480" cy="3525840"/>
+              <a:ext cx="6612120" cy="3525480"/>
             </a:xfrm>
             <a:prstGeom prst="rect">
               <a:avLst/>

</xml_diff>